<commit_message>
Cloning onto new PC.
</commit_message>
<xml_diff>
--- a/Extras/Intro.pptx
+++ b/Extras/Intro.pptx
@@ -108,15 +108,12 @@
       </a:defRPr>
     </a:lvl9pPr>
   </p:defaultTextStyle>
+  <p:extLst>
+    <p:ext uri="{EFAFB233-063F-42B5-8137-9DF3F51BA10A}">
+      <p15:sldGuideLst xmlns:p15="http://schemas.microsoft.com/office/powerpoint/2012/main"/>
+    </p:ext>
+  </p:extLst>
 </p:presentation>
-</file>
-
-<file path=ppt/revisionInfo.xml><?xml version="1.0" encoding="utf-8"?>
-<p1510:revInfo xmlns:a="http://schemas.openxmlformats.org/drawingml/2006/main" xmlns:r="http://schemas.openxmlformats.org/officeDocument/2006/relationships" xmlns:p1510="http://schemas.microsoft.com/office/powerpoint/2015/10/main">
-  <p1510:revLst>
-    <p1510:client id="{29B39CE8-4DE1-4F52-9753-0D42F0E26B27}" v="1" dt="2022-10-19T06:31:32.843"/>
-  </p1510:revLst>
-</p1510:revInfo>
 </file>
 
 <file path=ppt/changesInfos/changesInfo1.xml><?xml version="1.0" encoding="utf-8"?>
@@ -348,7 +345,7 @@
           <a:p>
             <a:fld id="{99633CCF-55F4-4503-A682-1714034D0F6A}" type="datetimeFigureOut">
               <a:rPr lang="en-SG" smtClean="0"/>
-              <a:t>19/10/2022</a:t>
+              <a:t>25/8/2023</a:t>
             </a:fld>
             <a:endParaRPr lang="en-SG"/>
           </a:p>
@@ -548,7 +545,7 @@
           <a:p>
             <a:fld id="{99633CCF-55F4-4503-A682-1714034D0F6A}" type="datetimeFigureOut">
               <a:rPr lang="en-SG" smtClean="0"/>
-              <a:t>19/10/2022</a:t>
+              <a:t>25/8/2023</a:t>
             </a:fld>
             <a:endParaRPr lang="en-SG"/>
           </a:p>
@@ -758,7 +755,7 @@
           <a:p>
             <a:fld id="{99633CCF-55F4-4503-A682-1714034D0F6A}" type="datetimeFigureOut">
               <a:rPr lang="en-SG" smtClean="0"/>
-              <a:t>19/10/2022</a:t>
+              <a:t>25/8/2023</a:t>
             </a:fld>
             <a:endParaRPr lang="en-SG"/>
           </a:p>
@@ -958,7 +955,7 @@
           <a:p>
             <a:fld id="{99633CCF-55F4-4503-A682-1714034D0F6A}" type="datetimeFigureOut">
               <a:rPr lang="en-SG" smtClean="0"/>
-              <a:t>19/10/2022</a:t>
+              <a:t>25/8/2023</a:t>
             </a:fld>
             <a:endParaRPr lang="en-SG"/>
           </a:p>
@@ -1234,7 +1231,7 @@
           <a:p>
             <a:fld id="{99633CCF-55F4-4503-A682-1714034D0F6A}" type="datetimeFigureOut">
               <a:rPr lang="en-SG" smtClean="0"/>
-              <a:t>19/10/2022</a:t>
+              <a:t>25/8/2023</a:t>
             </a:fld>
             <a:endParaRPr lang="en-SG"/>
           </a:p>
@@ -1502,7 +1499,7 @@
           <a:p>
             <a:fld id="{99633CCF-55F4-4503-A682-1714034D0F6A}" type="datetimeFigureOut">
               <a:rPr lang="en-SG" smtClean="0"/>
-              <a:t>19/10/2022</a:t>
+              <a:t>25/8/2023</a:t>
             </a:fld>
             <a:endParaRPr lang="en-SG"/>
           </a:p>
@@ -1917,7 +1914,7 @@
           <a:p>
             <a:fld id="{99633CCF-55F4-4503-A682-1714034D0F6A}" type="datetimeFigureOut">
               <a:rPr lang="en-SG" smtClean="0"/>
-              <a:t>19/10/2022</a:t>
+              <a:t>25/8/2023</a:t>
             </a:fld>
             <a:endParaRPr lang="en-SG"/>
           </a:p>
@@ -2059,7 +2056,7 @@
           <a:p>
             <a:fld id="{99633CCF-55F4-4503-A682-1714034D0F6A}" type="datetimeFigureOut">
               <a:rPr lang="en-SG" smtClean="0"/>
-              <a:t>19/10/2022</a:t>
+              <a:t>25/8/2023</a:t>
             </a:fld>
             <a:endParaRPr lang="en-SG"/>
           </a:p>
@@ -2172,7 +2169,7 @@
           <a:p>
             <a:fld id="{99633CCF-55F4-4503-A682-1714034D0F6A}" type="datetimeFigureOut">
               <a:rPr lang="en-SG" smtClean="0"/>
-              <a:t>19/10/2022</a:t>
+              <a:t>25/8/2023</a:t>
             </a:fld>
             <a:endParaRPr lang="en-SG"/>
           </a:p>
@@ -2485,7 +2482,7 @@
           <a:p>
             <a:fld id="{99633CCF-55F4-4503-A682-1714034D0F6A}" type="datetimeFigureOut">
               <a:rPr lang="en-SG" smtClean="0"/>
-              <a:t>19/10/2022</a:t>
+              <a:t>25/8/2023</a:t>
             </a:fld>
             <a:endParaRPr lang="en-SG"/>
           </a:p>
@@ -2774,7 +2771,7 @@
           <a:p>
             <a:fld id="{99633CCF-55F4-4503-A682-1714034D0F6A}" type="datetimeFigureOut">
               <a:rPr lang="en-SG" smtClean="0"/>
-              <a:t>19/10/2022</a:t>
+              <a:t>25/8/2023</a:t>
             </a:fld>
             <a:endParaRPr lang="en-SG"/>
           </a:p>
@@ -3017,7 +3014,7 @@
           <a:p>
             <a:fld id="{99633CCF-55F4-4503-A682-1714034D0F6A}" type="datetimeFigureOut">
               <a:rPr lang="en-SG" smtClean="0"/>
-              <a:t>19/10/2022</a:t>
+              <a:t>25/8/2023</a:t>
             </a:fld>
             <a:endParaRPr lang="en-SG"/>
           </a:p>
@@ -3568,11 +3565,11 @@
               <a:t>Deep Learning</a:t>
             </a:r>
             <a:br>
-              <a:rPr lang="en-US" dirty="0"/>
+              <a:rPr lang="en-US"/>
             </a:br>
             <a:r>
-              <a:rPr lang="en-US" dirty="0"/>
-              <a:t>W1 - Intro</a:t>
+              <a:rPr lang="en-US"/>
+              <a:t>Intro</a:t>
             </a:r>
             <a:endParaRPr lang="en-GB" dirty="0"/>
           </a:p>

</xml_diff>